<commit_message>
Hannah changes to Tutorial before MRes Cohort Training
</commit_message>
<xml_diff>
--- a/session1/Session1.pptx
+++ b/session1/Session1.pptx
@@ -4875,7 +4875,7 @@
   <dgm:whole/>
   <dgm:extLst>
     <a:ext uri="http://schemas.microsoft.com/office/drawing/2008/diagram">
-      <dsp:dataModelExt xmlns:dsp="http://schemas.microsoft.com/office/drawing/2008/diagram" relId="rId6" minVer="http://schemas.openxmlformats.org/drawingml/2006/diagram"/>
+      <dsp:dataModelExt xmlns:dsp="http://schemas.microsoft.com/office/drawing/2008/diagram" relId="rId7" minVer="http://schemas.openxmlformats.org/drawingml/2006/diagram"/>
     </a:ext>
   </dgm:extLst>
 </dgm:dataModel>
@@ -5129,7 +5129,7 @@
   <dgm:whole/>
   <dgm:extLst>
     <a:ext uri="http://schemas.microsoft.com/office/drawing/2008/diagram">
-      <dsp:dataModelExt xmlns:dsp="http://schemas.microsoft.com/office/drawing/2008/diagram" relId="rId6" minVer="http://schemas.openxmlformats.org/drawingml/2006/diagram"/>
+      <dsp:dataModelExt xmlns:dsp="http://schemas.microsoft.com/office/drawing/2008/diagram" relId="rId7" minVer="http://schemas.openxmlformats.org/drawingml/2006/diagram"/>
     </a:ext>
   </dgm:extLst>
 </dgm:dataModel>
@@ -5565,7 +5565,7 @@
   <dgm:whole/>
   <dgm:extLst>
     <a:ext uri="http://schemas.microsoft.com/office/drawing/2008/diagram">
-      <dsp:dataModelExt xmlns:dsp="http://schemas.microsoft.com/office/drawing/2008/diagram" relId="rId7" minVer="http://schemas.openxmlformats.org/drawingml/2006/diagram"/>
+      <dsp:dataModelExt xmlns:dsp="http://schemas.microsoft.com/office/drawing/2008/diagram" relId="rId8" minVer="http://schemas.openxmlformats.org/drawingml/2006/diagram"/>
     </a:ext>
   </dgm:extLst>
 </dgm:dataModel>
@@ -6021,7 +6021,7 @@
   <dgm:whole/>
   <dgm:extLst>
     <a:ext uri="http://schemas.microsoft.com/office/drawing/2008/diagram">
-      <dsp:dataModelExt xmlns:dsp="http://schemas.microsoft.com/office/drawing/2008/diagram" relId="rId7" minVer="http://schemas.openxmlformats.org/drawingml/2006/diagram"/>
+      <dsp:dataModelExt xmlns:dsp="http://schemas.microsoft.com/office/drawing/2008/diagram" relId="rId8" minVer="http://schemas.openxmlformats.org/drawingml/2006/diagram"/>
     </a:ext>
   </dgm:extLst>
 </dgm:dataModel>
@@ -16148,7 +16148,7 @@
           <a:p>
             <a:fld id="{E11BA457-BEF5-724C-B2AE-61139C530805}" type="datetimeFigureOut">
               <a:rPr lang="en-US" smtClean="0"/>
-              <a:t>10/15/24</a:t>
+              <a:t>10/16/24</a:t>
             </a:fld>
             <a:endParaRPr lang="en-US"/>
           </a:p>
@@ -16460,7 +16460,10 @@
           <a:bodyPr/>
           <a:lstStyle/>
           <a:p>
-            <a:endParaRPr lang="en-US" dirty="0"/>
+            <a:r>
+              <a:rPr lang="en-US" dirty="0"/>
+              <a:t>Brief intro to machine learning – what it is, roughly how we do it, and we’ll talk a bit about linear regression, which is a particular kind of ML algorithm</a:t>
+            </a:r>
           </a:p>
         </p:txBody>
       </p:sp>
@@ -16544,7 +16547,16 @@
           <a:bodyPr/>
           <a:lstStyle/>
           <a:p>
-            <a:endParaRPr lang="en-US" dirty="0"/>
+            <a:r>
+              <a:rPr lang="en-US" dirty="0"/>
+              <a:t>Input and output</a:t>
+            </a:r>
+          </a:p>
+          <a:p>
+            <a:r>
+              <a:rPr lang="en-US" dirty="0"/>
+              <a:t>M + c = model parameters, control what the line looks like – need to find optimal values for these so that the line describes the data well. Do this during training</a:t>
+            </a:r>
           </a:p>
         </p:txBody>
       </p:sp>
@@ -16565,7 +16577,7 @@
           <a:p>
             <a:fld id="{7F5114C7-38D7-A14C-A721-E01B38AB3211}" type="slidenum">
               <a:rPr lang="en-US" smtClean="0"/>
-              <a:t>12</a:t>
+              <a:t>10</a:t>
             </a:fld>
             <a:endParaRPr lang="en-US"/>
           </a:p>
@@ -16574,7 +16586,7 @@
     </p:spTree>
     <p:extLst>
       <p:ext uri="{BB962C8B-B14F-4D97-AF65-F5344CB8AC3E}">
-        <p14:creationId xmlns:p14="http://schemas.microsoft.com/office/powerpoint/2010/main" val="3412561595"/>
+        <p14:creationId xmlns:p14="http://schemas.microsoft.com/office/powerpoint/2010/main" val="683665501"/>
       </p:ext>
     </p:extLst>
   </p:cSld>
@@ -16649,7 +16661,7 @@
           <a:p>
             <a:fld id="{7F5114C7-38D7-A14C-A721-E01B38AB3211}" type="slidenum">
               <a:rPr lang="en-US" smtClean="0"/>
-              <a:t>13</a:t>
+              <a:t>11</a:t>
             </a:fld>
             <a:endParaRPr lang="en-US"/>
           </a:p>
@@ -16658,7 +16670,7 @@
     </p:spTree>
     <p:extLst>
       <p:ext uri="{BB962C8B-B14F-4D97-AF65-F5344CB8AC3E}">
-        <p14:creationId xmlns:p14="http://schemas.microsoft.com/office/powerpoint/2010/main" val="3869888569"/>
+        <p14:creationId xmlns:p14="http://schemas.microsoft.com/office/powerpoint/2010/main" val="2339378474"/>
       </p:ext>
     </p:extLst>
   </p:cSld>
@@ -16669,93 +16681,6 @@
 </file>
 
 <file path=ppt/notesSlides/notesSlide12.xml><?xml version="1.0" encoding="utf-8"?>
-<p:notes xmlns:a="http://schemas.openxmlformats.org/drawingml/2006/main" xmlns:r="http://schemas.openxmlformats.org/officeDocument/2006/relationships" xmlns:p="http://schemas.openxmlformats.org/presentationml/2006/main">
-  <p:cSld>
-    <p:spTree>
-      <p:nvGrpSpPr>
-        <p:cNvPr id="1" name=""/>
-        <p:cNvGrpSpPr/>
-        <p:nvPr/>
-      </p:nvGrpSpPr>
-      <p:grpSpPr>
-        <a:xfrm>
-          <a:off x="0" y="0"/>
-          <a:ext cx="0" cy="0"/>
-          <a:chOff x="0" y="0"/>
-          <a:chExt cx="0" cy="0"/>
-        </a:xfrm>
-      </p:grpSpPr>
-      <p:sp>
-        <p:nvSpPr>
-          <p:cNvPr id="2" name="Slide Image Placeholder 1"/>
-          <p:cNvSpPr>
-            <a:spLocks noGrp="1" noRot="1" noChangeAspect="1"/>
-          </p:cNvSpPr>
-          <p:nvPr>
-            <p:ph type="sldImg"/>
-          </p:nvPr>
-        </p:nvSpPr>
-        <p:spPr/>
-      </p:sp>
-      <p:sp>
-        <p:nvSpPr>
-          <p:cNvPr id="3" name="Notes Placeholder 2"/>
-          <p:cNvSpPr>
-            <a:spLocks noGrp="1"/>
-          </p:cNvSpPr>
-          <p:nvPr>
-            <p:ph type="body" idx="1"/>
-          </p:nvPr>
-        </p:nvSpPr>
-        <p:spPr/>
-        <p:txBody>
-          <a:bodyPr/>
-          <a:lstStyle/>
-          <a:p>
-            <a:r>
-              <a:rPr lang="en-US" dirty="0"/>
-              <a:t>Many iterations required</a:t>
-            </a:r>
-          </a:p>
-        </p:txBody>
-      </p:sp>
-      <p:sp>
-        <p:nvSpPr>
-          <p:cNvPr id="4" name="Slide Number Placeholder 3"/>
-          <p:cNvSpPr>
-            <a:spLocks noGrp="1"/>
-          </p:cNvSpPr>
-          <p:nvPr>
-            <p:ph type="sldNum" sz="quarter" idx="5"/>
-          </p:nvPr>
-        </p:nvSpPr>
-        <p:spPr/>
-        <p:txBody>
-          <a:bodyPr/>
-          <a:lstStyle/>
-          <a:p>
-            <a:fld id="{7F5114C7-38D7-A14C-A721-E01B38AB3211}" type="slidenum">
-              <a:rPr lang="en-US" smtClean="0"/>
-              <a:t>19</a:t>
-            </a:fld>
-            <a:endParaRPr lang="en-US"/>
-          </a:p>
-        </p:txBody>
-      </p:sp>
-    </p:spTree>
-    <p:extLst>
-      <p:ext uri="{BB962C8B-B14F-4D97-AF65-F5344CB8AC3E}">
-        <p14:creationId xmlns:p14="http://schemas.microsoft.com/office/powerpoint/2010/main" val="1166981114"/>
-      </p:ext>
-    </p:extLst>
-  </p:cSld>
-  <p:clrMapOvr>
-    <a:masterClrMapping/>
-  </p:clrMapOvr>
-</p:notes>
-</file>
-
-<file path=ppt/notesSlides/notesSlide13.xml><?xml version="1.0" encoding="utf-8"?>
 <p:notes xmlns:a="http://schemas.openxmlformats.org/drawingml/2006/main" xmlns:r="http://schemas.openxmlformats.org/officeDocument/2006/relationships" xmlns:p="http://schemas.openxmlformats.org/presentationml/2006/main">
   <p:cSld>
     <p:spTree>
@@ -16820,7 +16745,7 @@
           <a:p>
             <a:fld id="{7F5114C7-38D7-A14C-A721-E01B38AB3211}" type="slidenum">
               <a:rPr lang="en-US" smtClean="0"/>
-              <a:t>21</a:t>
+              <a:t>12</a:t>
             </a:fld>
             <a:endParaRPr lang="en-US"/>
           </a:p>
@@ -16829,7 +16754,100 @@
     </p:spTree>
     <p:extLst>
       <p:ext uri="{BB962C8B-B14F-4D97-AF65-F5344CB8AC3E}">
-        <p14:creationId xmlns:p14="http://schemas.microsoft.com/office/powerpoint/2010/main" val="3621318533"/>
+        <p14:creationId xmlns:p14="http://schemas.microsoft.com/office/powerpoint/2010/main" val="3412561595"/>
+      </p:ext>
+    </p:extLst>
+  </p:cSld>
+  <p:clrMapOvr>
+    <a:masterClrMapping/>
+  </p:clrMapOvr>
+</p:notes>
+</file>
+
+<file path=ppt/notesSlides/notesSlide13.xml><?xml version="1.0" encoding="utf-8"?>
+<p:notes xmlns:a="http://schemas.openxmlformats.org/drawingml/2006/main" xmlns:r="http://schemas.openxmlformats.org/officeDocument/2006/relationships" xmlns:p="http://schemas.openxmlformats.org/presentationml/2006/main">
+  <p:cSld>
+    <p:spTree>
+      <p:nvGrpSpPr>
+        <p:cNvPr id="1" name=""/>
+        <p:cNvGrpSpPr/>
+        <p:nvPr/>
+      </p:nvGrpSpPr>
+      <p:grpSpPr>
+        <a:xfrm>
+          <a:off x="0" y="0"/>
+          <a:ext cx="0" cy="0"/>
+          <a:chOff x="0" y="0"/>
+          <a:chExt cx="0" cy="0"/>
+        </a:xfrm>
+      </p:grpSpPr>
+      <p:sp>
+        <p:nvSpPr>
+          <p:cNvPr id="2" name="Slide Image Placeholder 1"/>
+          <p:cNvSpPr>
+            <a:spLocks noGrp="1" noRot="1" noChangeAspect="1"/>
+          </p:cNvSpPr>
+          <p:nvPr>
+            <p:ph type="sldImg"/>
+          </p:nvPr>
+        </p:nvSpPr>
+        <p:spPr/>
+      </p:sp>
+      <p:sp>
+        <p:nvSpPr>
+          <p:cNvPr id="3" name="Notes Placeholder 2"/>
+          <p:cNvSpPr>
+            <a:spLocks noGrp="1"/>
+          </p:cNvSpPr>
+          <p:nvPr>
+            <p:ph type="body" idx="1"/>
+          </p:nvPr>
+        </p:nvSpPr>
+        <p:spPr/>
+        <p:txBody>
+          <a:bodyPr/>
+          <a:lstStyle/>
+          <a:p>
+            <a:r>
+              <a:rPr lang="en-US" dirty="0"/>
+              <a:t>Start by plotting the existing data</a:t>
+            </a:r>
+          </a:p>
+          <a:p>
+            <a:r>
+              <a:rPr lang="en-US" dirty="0"/>
+              <a:t>Some noise, but following a linear trend</a:t>
+            </a:r>
+          </a:p>
+        </p:txBody>
+      </p:sp>
+      <p:sp>
+        <p:nvSpPr>
+          <p:cNvPr id="4" name="Slide Number Placeholder 3"/>
+          <p:cNvSpPr>
+            <a:spLocks noGrp="1"/>
+          </p:cNvSpPr>
+          <p:nvPr>
+            <p:ph type="sldNum" sz="quarter" idx="5"/>
+          </p:nvPr>
+        </p:nvSpPr>
+        <p:spPr/>
+        <p:txBody>
+          <a:bodyPr/>
+          <a:lstStyle/>
+          <a:p>
+            <a:fld id="{7F5114C7-38D7-A14C-A721-E01B38AB3211}" type="slidenum">
+              <a:rPr lang="en-US" smtClean="0"/>
+              <a:t>13</a:t>
+            </a:fld>
+            <a:endParaRPr lang="en-US"/>
+          </a:p>
+        </p:txBody>
+      </p:sp>
+    </p:spTree>
+    <p:extLst>
+      <p:ext uri="{BB962C8B-B14F-4D97-AF65-F5344CB8AC3E}">
+        <p14:creationId xmlns:p14="http://schemas.microsoft.com/office/powerpoint/2010/main" val="3869888569"/>
       </p:ext>
     </p:extLst>
   </p:cSld>
@@ -16884,26 +16902,8 @@
           <a:lstStyle/>
           <a:p>
             <a:r>
-              <a:rPr lang="en-US" dirty="0"/>
-              <a:t>Distance between actual and predicted point tells us how far the model is from describing a particular data point “perfectly”. For a single example, this distance is called the loss. Add up all the distances gives the cost. Want the cost to be as small as possible.</a:t>
-            </a:r>
-          </a:p>
-          <a:p>
-            <a:endParaRPr lang="en-US" dirty="0"/>
-          </a:p>
-          <a:p>
-            <a:r>
-              <a:rPr lang="en-US" dirty="0"/>
-              <a:t>Add in summation notation? Think it might just be unnecessary detail</a:t>
-            </a:r>
-          </a:p>
-          <a:p>
-            <a:endParaRPr lang="en-US" dirty="0"/>
-          </a:p>
-          <a:p>
-            <a:r>
-              <a:rPr lang="en-US" dirty="0"/>
-              <a:t>Note: might be best to update the label on this plot – relabel ”error” with loss? Or make mention of it when speaking (there was a question about it)</a:t>
+              <a:rPr lang="en-GB" dirty="0"/>
+              <a:t>Fit linear model</a:t>
             </a:r>
           </a:p>
         </p:txBody>
@@ -16925,7 +16925,7 @@
           <a:p>
             <a:fld id="{7F5114C7-38D7-A14C-A721-E01B38AB3211}" type="slidenum">
               <a:rPr lang="en-US" smtClean="0"/>
-              <a:t>22</a:t>
+              <a:t>14</a:t>
             </a:fld>
             <a:endParaRPr lang="en-US"/>
           </a:p>
@@ -16934,7 +16934,7 @@
     </p:spTree>
     <p:extLst>
       <p:ext uri="{BB962C8B-B14F-4D97-AF65-F5344CB8AC3E}">
-        <p14:creationId xmlns:p14="http://schemas.microsoft.com/office/powerpoint/2010/main" val="1790670379"/>
+        <p14:creationId xmlns:p14="http://schemas.microsoft.com/office/powerpoint/2010/main" val="2216982904"/>
       </p:ext>
     </p:extLst>
   </p:cSld>
@@ -16989,8 +16989,8 @@
           <a:lstStyle/>
           <a:p>
             <a:r>
-              <a:rPr lang="en-US" dirty="0"/>
-              <a:t>Believe us: for linear regression (ignoring the intercept parameter), the cost function looks like this. For a particular value of m, we can measure all the distances between the corresponding fit line and data points, and then calculate the cost, which is the y value on this plot.</a:t>
+              <a:rPr lang="en-GB" dirty="0"/>
+              <a:t>Given new apartment size, use best fit line to give price prediction </a:t>
             </a:r>
           </a:p>
         </p:txBody>
@@ -17012,7 +17012,7 @@
           <a:p>
             <a:fld id="{7F5114C7-38D7-A14C-A721-E01B38AB3211}" type="slidenum">
               <a:rPr lang="en-US" smtClean="0"/>
-              <a:t>23</a:t>
+              <a:t>15</a:t>
             </a:fld>
             <a:endParaRPr lang="en-US"/>
           </a:p>
@@ -17021,7 +17021,7 @@
     </p:spTree>
     <p:extLst>
       <p:ext uri="{BB962C8B-B14F-4D97-AF65-F5344CB8AC3E}">
-        <p14:creationId xmlns:p14="http://schemas.microsoft.com/office/powerpoint/2010/main" val="2435600715"/>
+        <p14:creationId xmlns:p14="http://schemas.microsoft.com/office/powerpoint/2010/main" val="4121691758"/>
       </p:ext>
     </p:extLst>
   </p:cSld>
@@ -17076,8 +17076,16 @@
           <a:lstStyle/>
           <a:p>
             <a:r>
-              <a:rPr lang="en-US" dirty="0"/>
-              <a:t>So we want to find the minimum of the cost function… how do we do that after starting at a random place?</a:t>
+              <a:rPr lang="en-GB" dirty="0"/>
+              <a:t>But how do we work out what that best fit line should be? </a:t>
+            </a:r>
+            <a:r>
+              <a:rPr lang="en-GB" dirty="0" err="1"/>
+              <a:t>Ie</a:t>
+            </a:r>
+            <a:r>
+              <a:rPr lang="en-GB" dirty="0"/>
+              <a:t>. Find best values for m and c </a:t>
             </a:r>
           </a:p>
         </p:txBody>
@@ -17099,7 +17107,7 @@
           <a:p>
             <a:fld id="{7F5114C7-38D7-A14C-A721-E01B38AB3211}" type="slidenum">
               <a:rPr lang="en-US" smtClean="0"/>
-              <a:t>24</a:t>
+              <a:t>17</a:t>
             </a:fld>
             <a:endParaRPr lang="en-US"/>
           </a:p>
@@ -17108,7 +17116,7 @@
     </p:spTree>
     <p:extLst>
       <p:ext uri="{BB962C8B-B14F-4D97-AF65-F5344CB8AC3E}">
-        <p14:creationId xmlns:p14="http://schemas.microsoft.com/office/powerpoint/2010/main" val="1905291360"/>
+        <p14:creationId xmlns:p14="http://schemas.microsoft.com/office/powerpoint/2010/main" val="2758521624"/>
       </p:ext>
     </p:extLst>
   </p:cSld>
@@ -17163,8 +17171,8 @@
           <a:lstStyle/>
           <a:p>
             <a:r>
-              <a:rPr lang="en-US" dirty="0"/>
-              <a:t>Gradient descent shows us the way!</a:t>
+              <a:rPr lang="en-GB" dirty="0"/>
+              <a:t>Introduce robot friend, going to talk about what we need to tell him to work out that best fit line</a:t>
             </a:r>
           </a:p>
         </p:txBody>
@@ -17186,7 +17194,7 @@
           <a:p>
             <a:fld id="{7F5114C7-38D7-A14C-A721-E01B38AB3211}" type="slidenum">
               <a:rPr lang="en-US" smtClean="0"/>
-              <a:t>25</a:t>
+              <a:t>18</a:t>
             </a:fld>
             <a:endParaRPr lang="en-US"/>
           </a:p>
@@ -17195,7 +17203,7 @@
     </p:spTree>
     <p:extLst>
       <p:ext uri="{BB962C8B-B14F-4D97-AF65-F5344CB8AC3E}">
-        <p14:creationId xmlns:p14="http://schemas.microsoft.com/office/powerpoint/2010/main" val="292062321"/>
+        <p14:creationId xmlns:p14="http://schemas.microsoft.com/office/powerpoint/2010/main" val="1176691909"/>
       </p:ext>
     </p:extLst>
   </p:cSld>
@@ -17249,7 +17257,49 @@
           <a:bodyPr/>
           <a:lstStyle/>
           <a:p>
+            <a:r>
+              <a:rPr lang="en-US" dirty="0"/>
+              <a:t>Training recipe that we can follow:</a:t>
+            </a:r>
+          </a:p>
+          <a:p>
+            <a:pPr marL="228600" indent="-228600">
+              <a:buAutoNum type="arabicPeriod"/>
+            </a:pPr>
+            <a:r>
+              <a:rPr lang="en-US" dirty="0"/>
+              <a:t>Take a guess – random initialization or look at data and estimate (go back to plot)</a:t>
+            </a:r>
+          </a:p>
+          <a:p>
+            <a:pPr marL="228600" indent="-228600">
+              <a:buAutoNum type="arabicPeriod"/>
+            </a:pPr>
+            <a:r>
+              <a:rPr lang="en-US" dirty="0"/>
+              <a:t>See how good that line is at describing the data – need something called the cost function to do this</a:t>
+            </a:r>
+          </a:p>
+          <a:p>
+            <a:pPr marL="228600" indent="-228600">
+              <a:buAutoNum type="arabicPeriod"/>
+            </a:pPr>
+            <a:r>
+              <a:rPr lang="en-US" dirty="0"/>
+              <a:t>Update parameters so that the new model does an even better job at describing the data</a:t>
+            </a:r>
+          </a:p>
+          <a:p>
+            <a:pPr marL="228600" indent="-228600">
+              <a:buAutoNum type="arabicPeriod"/>
+            </a:pPr>
             <a:endParaRPr lang="en-US" dirty="0"/>
+          </a:p>
+          <a:p>
+            <a:r>
+              <a:rPr lang="en-US" dirty="0"/>
+              <a:t>Many iterations required</a:t>
+            </a:r>
           </a:p>
         </p:txBody>
       </p:sp>
@@ -17270,7 +17320,7 @@
           <a:p>
             <a:fld id="{7F5114C7-38D7-A14C-A721-E01B38AB3211}" type="slidenum">
               <a:rPr lang="en-US" smtClean="0"/>
-              <a:t>27</a:t>
+              <a:t>19</a:t>
             </a:fld>
             <a:endParaRPr lang="en-US"/>
           </a:p>
@@ -17279,7 +17329,7 @@
     </p:spTree>
     <p:extLst>
       <p:ext uri="{BB962C8B-B14F-4D97-AF65-F5344CB8AC3E}">
-        <p14:creationId xmlns:p14="http://schemas.microsoft.com/office/powerpoint/2010/main" val="340121988"/>
+        <p14:creationId xmlns:p14="http://schemas.microsoft.com/office/powerpoint/2010/main" val="1166981114"/>
       </p:ext>
     </p:extLst>
   </p:cSld>
@@ -17333,7 +17383,7 @@
           <a:bodyPr/>
           <a:lstStyle/>
           <a:p>
-            <a:endParaRPr lang="en-US" dirty="0"/>
+            <a:endParaRPr lang="en-GB" dirty="0"/>
           </a:p>
         </p:txBody>
       </p:sp>
@@ -17354,7 +17404,7 @@
           <a:p>
             <a:fld id="{7F5114C7-38D7-A14C-A721-E01B38AB3211}" type="slidenum">
               <a:rPr lang="en-US" smtClean="0"/>
-              <a:t>28</a:t>
+              <a:t>20</a:t>
             </a:fld>
             <a:endParaRPr lang="en-US"/>
           </a:p>
@@ -17363,7 +17413,7 @@
     </p:spTree>
     <p:extLst>
       <p:ext uri="{BB962C8B-B14F-4D97-AF65-F5344CB8AC3E}">
-        <p14:creationId xmlns:p14="http://schemas.microsoft.com/office/powerpoint/2010/main" val="3528186992"/>
+        <p14:creationId xmlns:p14="http://schemas.microsoft.com/office/powerpoint/2010/main" val="4160571730"/>
       </p:ext>
     </p:extLst>
   </p:cSld>
@@ -17416,6 +17466,15 @@
         <p:txBody>
           <a:bodyPr/>
           <a:lstStyle/>
+          <a:p>
+            <a:r>
+              <a:rPr lang="en-US" dirty="0"/>
+              <a:t>You might not know it, but we are actually surrounded by a lot of ML applications in the real world e.g. filtering out spam in your email inbox or recommender systems on Netflix, or applications to medicine – take patient data e.g. images and use them to predict clinical outcomes/diagnose disease</a:t>
+            </a:r>
+          </a:p>
+          <a:p>
+            <a:endParaRPr lang="en-US" dirty="0"/>
+          </a:p>
           <a:p>
             <a:r>
               <a:rPr lang="en-US" dirty="0"/>
@@ -17506,6 +17565,765 @@
           <a:p>
             <a:r>
               <a:rPr lang="en-US" dirty="0"/>
+              <a:t>Cost function tells us how good the model really is at describing the data - measures difference between predicted and actual values</a:t>
+            </a:r>
+          </a:p>
+          <a:p>
+            <a:r>
+              <a:rPr lang="en-US" dirty="0"/>
+              <a:t>Green crosses – actual values of houses that have already sold</a:t>
+            </a:r>
+          </a:p>
+          <a:p>
+            <a:r>
+              <a:rPr lang="en-US" dirty="0"/>
+              <a:t>e.g. at 1 – actual value is 5, model predicts 3, difference of 2 between actual and predicted values</a:t>
+            </a:r>
+          </a:p>
+          <a:p>
+            <a:r>
+              <a:rPr lang="en-US" dirty="0"/>
+              <a:t>Add up all differences/losses – gives us the cost. Good model will minimize those differences</a:t>
+            </a:r>
+          </a:p>
+        </p:txBody>
+      </p:sp>
+      <p:sp>
+        <p:nvSpPr>
+          <p:cNvPr id="4" name="Slide Number Placeholder 3"/>
+          <p:cNvSpPr>
+            <a:spLocks noGrp="1"/>
+          </p:cNvSpPr>
+          <p:nvPr>
+            <p:ph type="sldNum" sz="quarter" idx="5"/>
+          </p:nvPr>
+        </p:nvSpPr>
+        <p:spPr/>
+        <p:txBody>
+          <a:bodyPr/>
+          <a:lstStyle/>
+          <a:p>
+            <a:fld id="{7F5114C7-38D7-A14C-A721-E01B38AB3211}" type="slidenum">
+              <a:rPr lang="en-US" smtClean="0"/>
+              <a:t>21</a:t>
+            </a:fld>
+            <a:endParaRPr lang="en-US"/>
+          </a:p>
+        </p:txBody>
+      </p:sp>
+    </p:spTree>
+    <p:extLst>
+      <p:ext uri="{BB962C8B-B14F-4D97-AF65-F5344CB8AC3E}">
+        <p14:creationId xmlns:p14="http://schemas.microsoft.com/office/powerpoint/2010/main" val="3621318533"/>
+      </p:ext>
+    </p:extLst>
+  </p:cSld>
+  <p:clrMapOvr>
+    <a:masterClrMapping/>
+  </p:clrMapOvr>
+</p:notes>
+</file>
+
+<file path=ppt/notesSlides/notesSlide21.xml><?xml version="1.0" encoding="utf-8"?>
+<p:notes xmlns:a="http://schemas.openxmlformats.org/drawingml/2006/main" xmlns:r="http://schemas.openxmlformats.org/officeDocument/2006/relationships" xmlns:p="http://schemas.openxmlformats.org/presentationml/2006/main">
+  <p:cSld>
+    <p:spTree>
+      <p:nvGrpSpPr>
+        <p:cNvPr id="1" name=""/>
+        <p:cNvGrpSpPr/>
+        <p:nvPr/>
+      </p:nvGrpSpPr>
+      <p:grpSpPr>
+        <a:xfrm>
+          <a:off x="0" y="0"/>
+          <a:ext cx="0" cy="0"/>
+          <a:chOff x="0" y="0"/>
+          <a:chExt cx="0" cy="0"/>
+        </a:xfrm>
+      </p:grpSpPr>
+      <p:sp>
+        <p:nvSpPr>
+          <p:cNvPr id="2" name="Slide Image Placeholder 1"/>
+          <p:cNvSpPr>
+            <a:spLocks noGrp="1" noRot="1" noChangeAspect="1"/>
+          </p:cNvSpPr>
+          <p:nvPr>
+            <p:ph type="sldImg"/>
+          </p:nvPr>
+        </p:nvSpPr>
+        <p:spPr/>
+      </p:sp>
+      <p:sp>
+        <p:nvSpPr>
+          <p:cNvPr id="3" name="Notes Placeholder 2"/>
+          <p:cNvSpPr>
+            <a:spLocks noGrp="1"/>
+          </p:cNvSpPr>
+          <p:nvPr>
+            <p:ph type="body" idx="1"/>
+          </p:nvPr>
+        </p:nvSpPr>
+        <p:spPr/>
+        <p:txBody>
+          <a:bodyPr/>
+          <a:lstStyle/>
+          <a:p>
+            <a:r>
+              <a:rPr lang="en-US" dirty="0"/>
+              <a:t>Distance between actual and predicted point tells us how far the model is from describing a particular data point “perfectly”. For a single example, this distance is called the loss. Add up all the distances gives the cost. Want the cost to be as small as possible.</a:t>
+            </a:r>
+          </a:p>
+          <a:p>
+            <a:endParaRPr lang="en-US" dirty="0"/>
+          </a:p>
+          <a:p>
+            <a:r>
+              <a:rPr lang="en-US" dirty="0"/>
+              <a:t>Note: might be best to update the label on this plot – relabel ”error” with loss? Or make mention of it when speaking (there was a question about it)</a:t>
+            </a:r>
+          </a:p>
+        </p:txBody>
+      </p:sp>
+      <p:sp>
+        <p:nvSpPr>
+          <p:cNvPr id="4" name="Slide Number Placeholder 3"/>
+          <p:cNvSpPr>
+            <a:spLocks noGrp="1"/>
+          </p:cNvSpPr>
+          <p:nvPr>
+            <p:ph type="sldNum" sz="quarter" idx="5"/>
+          </p:nvPr>
+        </p:nvSpPr>
+        <p:spPr/>
+        <p:txBody>
+          <a:bodyPr/>
+          <a:lstStyle/>
+          <a:p>
+            <a:fld id="{7F5114C7-38D7-A14C-A721-E01B38AB3211}" type="slidenum">
+              <a:rPr lang="en-US" smtClean="0"/>
+              <a:t>22</a:t>
+            </a:fld>
+            <a:endParaRPr lang="en-US"/>
+          </a:p>
+        </p:txBody>
+      </p:sp>
+    </p:spTree>
+    <p:extLst>
+      <p:ext uri="{BB962C8B-B14F-4D97-AF65-F5344CB8AC3E}">
+        <p14:creationId xmlns:p14="http://schemas.microsoft.com/office/powerpoint/2010/main" val="1790670379"/>
+      </p:ext>
+    </p:extLst>
+  </p:cSld>
+  <p:clrMapOvr>
+    <a:masterClrMapping/>
+  </p:clrMapOvr>
+</p:notes>
+</file>
+
+<file path=ppt/notesSlides/notesSlide22.xml><?xml version="1.0" encoding="utf-8"?>
+<p:notes xmlns:a="http://schemas.openxmlformats.org/drawingml/2006/main" xmlns:r="http://schemas.openxmlformats.org/officeDocument/2006/relationships" xmlns:p="http://schemas.openxmlformats.org/presentationml/2006/main">
+  <p:cSld>
+    <p:spTree>
+      <p:nvGrpSpPr>
+        <p:cNvPr id="1" name=""/>
+        <p:cNvGrpSpPr/>
+        <p:nvPr/>
+      </p:nvGrpSpPr>
+      <p:grpSpPr>
+        <a:xfrm>
+          <a:off x="0" y="0"/>
+          <a:ext cx="0" cy="0"/>
+          <a:chOff x="0" y="0"/>
+          <a:chExt cx="0" cy="0"/>
+        </a:xfrm>
+      </p:grpSpPr>
+      <p:sp>
+        <p:nvSpPr>
+          <p:cNvPr id="2" name="Slide Image Placeholder 1"/>
+          <p:cNvSpPr>
+            <a:spLocks noGrp="1" noRot="1" noChangeAspect="1"/>
+          </p:cNvSpPr>
+          <p:nvPr>
+            <p:ph type="sldImg"/>
+          </p:nvPr>
+        </p:nvSpPr>
+        <p:spPr/>
+      </p:sp>
+      <p:sp>
+        <p:nvSpPr>
+          <p:cNvPr id="3" name="Notes Placeholder 2"/>
+          <p:cNvSpPr>
+            <a:spLocks noGrp="1"/>
+          </p:cNvSpPr>
+          <p:nvPr>
+            <p:ph type="body" idx="1"/>
+          </p:nvPr>
+        </p:nvSpPr>
+        <p:spPr/>
+        <p:txBody>
+          <a:bodyPr/>
+          <a:lstStyle/>
+          <a:p>
+            <a:r>
+              <a:rPr lang="en-US" dirty="0"/>
+              <a:t>Believe us: for linear regression (ignoring the intercept parameter), the cost function looks like this. For a particular value of m, we can measure all the distances between the corresponding fit line and data points, and then calculate the cost, which is the y value on this plot.</a:t>
+            </a:r>
+          </a:p>
+          <a:p>
+            <a:endParaRPr lang="en-US" dirty="0"/>
+          </a:p>
+          <a:p>
+            <a:r>
+              <a:rPr lang="en-US" dirty="0"/>
+              <a:t>Best model corresponds to minimum of the cost function (sum of all errors)</a:t>
+            </a:r>
+          </a:p>
+        </p:txBody>
+      </p:sp>
+      <p:sp>
+        <p:nvSpPr>
+          <p:cNvPr id="4" name="Slide Number Placeholder 3"/>
+          <p:cNvSpPr>
+            <a:spLocks noGrp="1"/>
+          </p:cNvSpPr>
+          <p:nvPr>
+            <p:ph type="sldNum" sz="quarter" idx="5"/>
+          </p:nvPr>
+        </p:nvSpPr>
+        <p:spPr/>
+        <p:txBody>
+          <a:bodyPr/>
+          <a:lstStyle/>
+          <a:p>
+            <a:fld id="{7F5114C7-38D7-A14C-A721-E01B38AB3211}" type="slidenum">
+              <a:rPr lang="en-US" smtClean="0"/>
+              <a:t>23</a:t>
+            </a:fld>
+            <a:endParaRPr lang="en-US"/>
+          </a:p>
+        </p:txBody>
+      </p:sp>
+    </p:spTree>
+    <p:extLst>
+      <p:ext uri="{BB962C8B-B14F-4D97-AF65-F5344CB8AC3E}">
+        <p14:creationId xmlns:p14="http://schemas.microsoft.com/office/powerpoint/2010/main" val="2435600715"/>
+      </p:ext>
+    </p:extLst>
+  </p:cSld>
+  <p:clrMapOvr>
+    <a:masterClrMapping/>
+  </p:clrMapOvr>
+</p:notes>
+</file>
+
+<file path=ppt/notesSlides/notesSlide23.xml><?xml version="1.0" encoding="utf-8"?>
+<p:notes xmlns:a="http://schemas.openxmlformats.org/drawingml/2006/main" xmlns:r="http://schemas.openxmlformats.org/officeDocument/2006/relationships" xmlns:p="http://schemas.openxmlformats.org/presentationml/2006/main">
+  <p:cSld>
+    <p:spTree>
+      <p:nvGrpSpPr>
+        <p:cNvPr id="1" name=""/>
+        <p:cNvGrpSpPr/>
+        <p:nvPr/>
+      </p:nvGrpSpPr>
+      <p:grpSpPr>
+        <a:xfrm>
+          <a:off x="0" y="0"/>
+          <a:ext cx="0" cy="0"/>
+          <a:chOff x="0" y="0"/>
+          <a:chExt cx="0" cy="0"/>
+        </a:xfrm>
+      </p:grpSpPr>
+      <p:sp>
+        <p:nvSpPr>
+          <p:cNvPr id="2" name="Slide Image Placeholder 1"/>
+          <p:cNvSpPr>
+            <a:spLocks noGrp="1" noRot="1" noChangeAspect="1"/>
+          </p:cNvSpPr>
+          <p:nvPr>
+            <p:ph type="sldImg"/>
+          </p:nvPr>
+        </p:nvSpPr>
+        <p:spPr/>
+      </p:sp>
+      <p:sp>
+        <p:nvSpPr>
+          <p:cNvPr id="3" name="Notes Placeholder 2"/>
+          <p:cNvSpPr>
+            <a:spLocks noGrp="1"/>
+          </p:cNvSpPr>
+          <p:nvPr>
+            <p:ph type="body" idx="1"/>
+          </p:nvPr>
+        </p:nvSpPr>
+        <p:spPr/>
+        <p:txBody>
+          <a:bodyPr/>
+          <a:lstStyle/>
+          <a:p>
+            <a:r>
+              <a:rPr lang="en-US" dirty="0"/>
+              <a:t>So we want to find the minimum of the cost function… how do we do that after starting at a random place?</a:t>
+            </a:r>
+          </a:p>
+        </p:txBody>
+      </p:sp>
+      <p:sp>
+        <p:nvSpPr>
+          <p:cNvPr id="4" name="Slide Number Placeholder 3"/>
+          <p:cNvSpPr>
+            <a:spLocks noGrp="1"/>
+          </p:cNvSpPr>
+          <p:nvPr>
+            <p:ph type="sldNum" sz="quarter" idx="5"/>
+          </p:nvPr>
+        </p:nvSpPr>
+        <p:spPr/>
+        <p:txBody>
+          <a:bodyPr/>
+          <a:lstStyle/>
+          <a:p>
+            <a:fld id="{7F5114C7-38D7-A14C-A721-E01B38AB3211}" type="slidenum">
+              <a:rPr lang="en-US" smtClean="0"/>
+              <a:t>24</a:t>
+            </a:fld>
+            <a:endParaRPr lang="en-US"/>
+          </a:p>
+        </p:txBody>
+      </p:sp>
+    </p:spTree>
+    <p:extLst>
+      <p:ext uri="{BB962C8B-B14F-4D97-AF65-F5344CB8AC3E}">
+        <p14:creationId xmlns:p14="http://schemas.microsoft.com/office/powerpoint/2010/main" val="1905291360"/>
+      </p:ext>
+    </p:extLst>
+  </p:cSld>
+  <p:clrMapOvr>
+    <a:masterClrMapping/>
+  </p:clrMapOvr>
+</p:notes>
+</file>
+
+<file path=ppt/notesSlides/notesSlide24.xml><?xml version="1.0" encoding="utf-8"?>
+<p:notes xmlns:a="http://schemas.openxmlformats.org/drawingml/2006/main" xmlns:r="http://schemas.openxmlformats.org/officeDocument/2006/relationships" xmlns:p="http://schemas.openxmlformats.org/presentationml/2006/main">
+  <p:cSld>
+    <p:spTree>
+      <p:nvGrpSpPr>
+        <p:cNvPr id="1" name=""/>
+        <p:cNvGrpSpPr/>
+        <p:nvPr/>
+      </p:nvGrpSpPr>
+      <p:grpSpPr>
+        <a:xfrm>
+          <a:off x="0" y="0"/>
+          <a:ext cx="0" cy="0"/>
+          <a:chOff x="0" y="0"/>
+          <a:chExt cx="0" cy="0"/>
+        </a:xfrm>
+      </p:grpSpPr>
+      <p:sp>
+        <p:nvSpPr>
+          <p:cNvPr id="2" name="Slide Image Placeholder 1"/>
+          <p:cNvSpPr>
+            <a:spLocks noGrp="1" noRot="1" noChangeAspect="1"/>
+          </p:cNvSpPr>
+          <p:nvPr>
+            <p:ph type="sldImg"/>
+          </p:nvPr>
+        </p:nvSpPr>
+        <p:spPr/>
+      </p:sp>
+      <p:sp>
+        <p:nvSpPr>
+          <p:cNvPr id="3" name="Notes Placeholder 2"/>
+          <p:cNvSpPr>
+            <a:spLocks noGrp="1"/>
+          </p:cNvSpPr>
+          <p:nvPr>
+            <p:ph type="body" idx="1"/>
+          </p:nvPr>
+        </p:nvSpPr>
+        <p:spPr/>
+        <p:txBody>
+          <a:bodyPr/>
+          <a:lstStyle/>
+          <a:p>
+            <a:r>
+              <a:rPr lang="en-US" dirty="0"/>
+              <a:t>Gradient descent shows us the way!</a:t>
+            </a:r>
+          </a:p>
+          <a:p>
+            <a:endParaRPr lang="en-US" dirty="0"/>
+          </a:p>
+          <a:p>
+            <a:r>
+              <a:rPr lang="en-US" dirty="0"/>
+              <a:t>Tells us how to update the model parameters to get the line closer to the data</a:t>
+            </a:r>
+          </a:p>
+        </p:txBody>
+      </p:sp>
+      <p:sp>
+        <p:nvSpPr>
+          <p:cNvPr id="4" name="Slide Number Placeholder 3"/>
+          <p:cNvSpPr>
+            <a:spLocks noGrp="1"/>
+          </p:cNvSpPr>
+          <p:nvPr>
+            <p:ph type="sldNum" sz="quarter" idx="5"/>
+          </p:nvPr>
+        </p:nvSpPr>
+        <p:spPr/>
+        <p:txBody>
+          <a:bodyPr/>
+          <a:lstStyle/>
+          <a:p>
+            <a:fld id="{7F5114C7-38D7-A14C-A721-E01B38AB3211}" type="slidenum">
+              <a:rPr lang="en-US" smtClean="0"/>
+              <a:t>25</a:t>
+            </a:fld>
+            <a:endParaRPr lang="en-US"/>
+          </a:p>
+        </p:txBody>
+      </p:sp>
+    </p:spTree>
+    <p:extLst>
+      <p:ext uri="{BB962C8B-B14F-4D97-AF65-F5344CB8AC3E}">
+        <p14:creationId xmlns:p14="http://schemas.microsoft.com/office/powerpoint/2010/main" val="292062321"/>
+      </p:ext>
+    </p:extLst>
+  </p:cSld>
+  <p:clrMapOvr>
+    <a:masterClrMapping/>
+  </p:clrMapOvr>
+</p:notes>
+</file>
+
+<file path=ppt/notesSlides/notesSlide25.xml><?xml version="1.0" encoding="utf-8"?>
+<p:notes xmlns:a="http://schemas.openxmlformats.org/drawingml/2006/main" xmlns:r="http://schemas.openxmlformats.org/officeDocument/2006/relationships" xmlns:p="http://schemas.openxmlformats.org/presentationml/2006/main">
+  <p:cSld>
+    <p:spTree>
+      <p:nvGrpSpPr>
+        <p:cNvPr id="1" name=""/>
+        <p:cNvGrpSpPr/>
+        <p:nvPr/>
+      </p:nvGrpSpPr>
+      <p:grpSpPr>
+        <a:xfrm>
+          <a:off x="0" y="0"/>
+          <a:ext cx="0" cy="0"/>
+          <a:chOff x="0" y="0"/>
+          <a:chExt cx="0" cy="0"/>
+        </a:xfrm>
+      </p:grpSpPr>
+      <p:sp>
+        <p:nvSpPr>
+          <p:cNvPr id="2" name="Slide Image Placeholder 1"/>
+          <p:cNvSpPr>
+            <a:spLocks noGrp="1" noRot="1" noChangeAspect="1"/>
+          </p:cNvSpPr>
+          <p:nvPr>
+            <p:ph type="sldImg"/>
+          </p:nvPr>
+        </p:nvSpPr>
+        <p:spPr/>
+      </p:sp>
+      <p:sp>
+        <p:nvSpPr>
+          <p:cNvPr id="3" name="Notes Placeholder 2"/>
+          <p:cNvSpPr>
+            <a:spLocks noGrp="1"/>
+          </p:cNvSpPr>
+          <p:nvPr>
+            <p:ph type="body" idx="1"/>
+          </p:nvPr>
+        </p:nvSpPr>
+        <p:spPr/>
+        <p:txBody>
+          <a:bodyPr/>
+          <a:lstStyle/>
+          <a:p>
+            <a:r>
+              <a:rPr lang="en-GB" dirty="0"/>
+              <a:t>Could change the line by a big amount, but that might not be good</a:t>
+            </a:r>
+          </a:p>
+        </p:txBody>
+      </p:sp>
+      <p:sp>
+        <p:nvSpPr>
+          <p:cNvPr id="4" name="Slide Number Placeholder 3"/>
+          <p:cNvSpPr>
+            <a:spLocks noGrp="1"/>
+          </p:cNvSpPr>
+          <p:nvPr>
+            <p:ph type="sldNum" sz="quarter" idx="5"/>
+          </p:nvPr>
+        </p:nvSpPr>
+        <p:spPr/>
+        <p:txBody>
+          <a:bodyPr/>
+          <a:lstStyle/>
+          <a:p>
+            <a:fld id="{7F5114C7-38D7-A14C-A721-E01B38AB3211}" type="slidenum">
+              <a:rPr lang="en-US" smtClean="0"/>
+              <a:t>26</a:t>
+            </a:fld>
+            <a:endParaRPr lang="en-US"/>
+          </a:p>
+        </p:txBody>
+      </p:sp>
+    </p:spTree>
+    <p:extLst>
+      <p:ext uri="{BB962C8B-B14F-4D97-AF65-F5344CB8AC3E}">
+        <p14:creationId xmlns:p14="http://schemas.microsoft.com/office/powerpoint/2010/main" val="1410018696"/>
+      </p:ext>
+    </p:extLst>
+  </p:cSld>
+  <p:clrMapOvr>
+    <a:masterClrMapping/>
+  </p:clrMapOvr>
+</p:notes>
+</file>
+
+<file path=ppt/notesSlides/notesSlide26.xml><?xml version="1.0" encoding="utf-8"?>
+<p:notes xmlns:a="http://schemas.openxmlformats.org/drawingml/2006/main" xmlns:r="http://schemas.openxmlformats.org/officeDocument/2006/relationships" xmlns:p="http://schemas.openxmlformats.org/presentationml/2006/main">
+  <p:cSld>
+    <p:spTree>
+      <p:nvGrpSpPr>
+        <p:cNvPr id="1" name=""/>
+        <p:cNvGrpSpPr/>
+        <p:nvPr/>
+      </p:nvGrpSpPr>
+      <p:grpSpPr>
+        <a:xfrm>
+          <a:off x="0" y="0"/>
+          <a:ext cx="0" cy="0"/>
+          <a:chOff x="0" y="0"/>
+          <a:chExt cx="0" cy="0"/>
+        </a:xfrm>
+      </p:grpSpPr>
+      <p:sp>
+        <p:nvSpPr>
+          <p:cNvPr id="2" name="Slide Image Placeholder 1"/>
+          <p:cNvSpPr>
+            <a:spLocks noGrp="1" noRot="1" noChangeAspect="1"/>
+          </p:cNvSpPr>
+          <p:nvPr>
+            <p:ph type="sldImg"/>
+          </p:nvPr>
+        </p:nvSpPr>
+        <p:spPr/>
+      </p:sp>
+      <p:sp>
+        <p:nvSpPr>
+          <p:cNvPr id="3" name="Notes Placeholder 2"/>
+          <p:cNvSpPr>
+            <a:spLocks noGrp="1"/>
+          </p:cNvSpPr>
+          <p:nvPr>
+            <p:ph type="body" idx="1"/>
+          </p:nvPr>
+        </p:nvSpPr>
+        <p:spPr/>
+        <p:txBody>
+          <a:bodyPr/>
+          <a:lstStyle/>
+          <a:p>
+            <a:r>
+              <a:rPr lang="en-US" dirty="0"/>
+              <a:t>Getting the learning rate right can be very important in some problems</a:t>
+            </a:r>
+          </a:p>
+        </p:txBody>
+      </p:sp>
+      <p:sp>
+        <p:nvSpPr>
+          <p:cNvPr id="4" name="Slide Number Placeholder 3"/>
+          <p:cNvSpPr>
+            <a:spLocks noGrp="1"/>
+          </p:cNvSpPr>
+          <p:nvPr>
+            <p:ph type="sldNum" sz="quarter" idx="5"/>
+          </p:nvPr>
+        </p:nvSpPr>
+        <p:spPr/>
+        <p:txBody>
+          <a:bodyPr/>
+          <a:lstStyle/>
+          <a:p>
+            <a:fld id="{7F5114C7-38D7-A14C-A721-E01B38AB3211}" type="slidenum">
+              <a:rPr lang="en-US" smtClean="0"/>
+              <a:t>27</a:t>
+            </a:fld>
+            <a:endParaRPr lang="en-US"/>
+          </a:p>
+        </p:txBody>
+      </p:sp>
+    </p:spTree>
+    <p:extLst>
+      <p:ext uri="{BB962C8B-B14F-4D97-AF65-F5344CB8AC3E}">
+        <p14:creationId xmlns:p14="http://schemas.microsoft.com/office/powerpoint/2010/main" val="340121988"/>
+      </p:ext>
+    </p:extLst>
+  </p:cSld>
+  <p:clrMapOvr>
+    <a:masterClrMapping/>
+  </p:clrMapOvr>
+</p:notes>
+</file>
+
+<file path=ppt/notesSlides/notesSlide27.xml><?xml version="1.0" encoding="utf-8"?>
+<p:notes xmlns:a="http://schemas.openxmlformats.org/drawingml/2006/main" xmlns:r="http://schemas.openxmlformats.org/officeDocument/2006/relationships" xmlns:p="http://schemas.openxmlformats.org/presentationml/2006/main">
+  <p:cSld>
+    <p:spTree>
+      <p:nvGrpSpPr>
+        <p:cNvPr id="1" name=""/>
+        <p:cNvGrpSpPr/>
+        <p:nvPr/>
+      </p:nvGrpSpPr>
+      <p:grpSpPr>
+        <a:xfrm>
+          <a:off x="0" y="0"/>
+          <a:ext cx="0" cy="0"/>
+          <a:chOff x="0" y="0"/>
+          <a:chExt cx="0" cy="0"/>
+        </a:xfrm>
+      </p:grpSpPr>
+      <p:sp>
+        <p:nvSpPr>
+          <p:cNvPr id="2" name="Slide Image Placeholder 1"/>
+          <p:cNvSpPr>
+            <a:spLocks noGrp="1" noRot="1" noChangeAspect="1"/>
+          </p:cNvSpPr>
+          <p:nvPr>
+            <p:ph type="sldImg"/>
+          </p:nvPr>
+        </p:nvSpPr>
+        <p:spPr/>
+      </p:sp>
+      <p:sp>
+        <p:nvSpPr>
+          <p:cNvPr id="3" name="Notes Placeholder 2"/>
+          <p:cNvSpPr>
+            <a:spLocks noGrp="1"/>
+          </p:cNvSpPr>
+          <p:nvPr>
+            <p:ph type="body" idx="1"/>
+          </p:nvPr>
+        </p:nvSpPr>
+        <p:spPr/>
+        <p:txBody>
+          <a:bodyPr/>
+          <a:lstStyle/>
+          <a:p>
+            <a:r>
+              <a:rPr lang="en-US" dirty="0"/>
+              <a:t>Animation emphasizing relationship between best fit line and cost function</a:t>
+            </a:r>
+          </a:p>
+          <a:p>
+            <a:endParaRPr lang="en-US" dirty="0"/>
+          </a:p>
+          <a:p>
+            <a:r>
+              <a:rPr lang="en-US" dirty="0"/>
+              <a:t>Small learning rate – small steps, take a long time to get there, </a:t>
+            </a:r>
+          </a:p>
+          <a:p>
+            <a:endParaRPr lang="en-US" dirty="0"/>
+          </a:p>
+          <a:p>
+            <a:r>
+              <a:rPr lang="en-US" dirty="0"/>
+              <a:t>But too big: overshoot</a:t>
+            </a:r>
+          </a:p>
+        </p:txBody>
+      </p:sp>
+      <p:sp>
+        <p:nvSpPr>
+          <p:cNvPr id="4" name="Slide Number Placeholder 3"/>
+          <p:cNvSpPr>
+            <a:spLocks noGrp="1"/>
+          </p:cNvSpPr>
+          <p:nvPr>
+            <p:ph type="sldNum" sz="quarter" idx="5"/>
+          </p:nvPr>
+        </p:nvSpPr>
+        <p:spPr/>
+        <p:txBody>
+          <a:bodyPr/>
+          <a:lstStyle/>
+          <a:p>
+            <a:fld id="{7F5114C7-38D7-A14C-A721-E01B38AB3211}" type="slidenum">
+              <a:rPr lang="en-US" smtClean="0"/>
+              <a:t>28</a:t>
+            </a:fld>
+            <a:endParaRPr lang="en-US"/>
+          </a:p>
+        </p:txBody>
+      </p:sp>
+    </p:spTree>
+    <p:extLst>
+      <p:ext uri="{BB962C8B-B14F-4D97-AF65-F5344CB8AC3E}">
+        <p14:creationId xmlns:p14="http://schemas.microsoft.com/office/powerpoint/2010/main" val="3528186992"/>
+      </p:ext>
+    </p:extLst>
+  </p:cSld>
+  <p:clrMapOvr>
+    <a:masterClrMapping/>
+  </p:clrMapOvr>
+</p:notes>
+</file>
+
+<file path=ppt/notesSlides/notesSlide28.xml><?xml version="1.0" encoding="utf-8"?>
+<p:notes xmlns:a="http://schemas.openxmlformats.org/drawingml/2006/main" xmlns:r="http://schemas.openxmlformats.org/officeDocument/2006/relationships" xmlns:p="http://schemas.openxmlformats.org/presentationml/2006/main">
+  <p:cSld>
+    <p:spTree>
+      <p:nvGrpSpPr>
+        <p:cNvPr id="1" name=""/>
+        <p:cNvGrpSpPr/>
+        <p:nvPr/>
+      </p:nvGrpSpPr>
+      <p:grpSpPr>
+        <a:xfrm>
+          <a:off x="0" y="0"/>
+          <a:ext cx="0" cy="0"/>
+          <a:chOff x="0" y="0"/>
+          <a:chExt cx="0" cy="0"/>
+        </a:xfrm>
+      </p:grpSpPr>
+      <p:sp>
+        <p:nvSpPr>
+          <p:cNvPr id="2" name="Slide Image Placeholder 1"/>
+          <p:cNvSpPr>
+            <a:spLocks noGrp="1" noRot="1" noChangeAspect="1"/>
+          </p:cNvSpPr>
+          <p:nvPr>
+            <p:ph type="sldImg"/>
+          </p:nvPr>
+        </p:nvSpPr>
+        <p:spPr/>
+      </p:sp>
+      <p:sp>
+        <p:nvSpPr>
+          <p:cNvPr id="3" name="Notes Placeholder 2"/>
+          <p:cNvSpPr>
+            <a:spLocks noGrp="1"/>
+          </p:cNvSpPr>
+          <p:nvPr>
+            <p:ph type="body" idx="1"/>
+          </p:nvPr>
+        </p:nvSpPr>
+        <p:spPr/>
+        <p:txBody>
+          <a:bodyPr/>
+          <a:lstStyle/>
+          <a:p>
+            <a:r>
+              <a:rPr lang="en-US" dirty="0"/>
               <a:t>Maybe use image here</a:t>
             </a:r>
           </a:p>
@@ -17547,7 +18365,7 @@
 </p:notes>
 </file>
 
-<file path=ppt/notesSlides/notesSlide21.xml><?xml version="1.0" encoding="utf-8"?>
+<file path=ppt/notesSlides/notesSlide29.xml><?xml version="1.0" encoding="utf-8"?>
 <p:notes xmlns:a="http://schemas.openxmlformats.org/drawingml/2006/main" xmlns:r="http://schemas.openxmlformats.org/officeDocument/2006/relationships" xmlns:p="http://schemas.openxmlformats.org/presentationml/2006/main">
   <p:cSld>
     <p:spTree>
@@ -17634,7 +18452,108 @@
 </p:notes>
 </file>
 
-<file path=ppt/notesSlides/notesSlide22.xml><?xml version="1.0" encoding="utf-8"?>
+<file path=ppt/notesSlides/notesSlide3.xml><?xml version="1.0" encoding="utf-8"?>
+<p:notes xmlns:a="http://schemas.openxmlformats.org/drawingml/2006/main" xmlns:r="http://schemas.openxmlformats.org/officeDocument/2006/relationships" xmlns:p="http://schemas.openxmlformats.org/presentationml/2006/main">
+  <p:cSld>
+    <p:spTree>
+      <p:nvGrpSpPr>
+        <p:cNvPr id="1" name=""/>
+        <p:cNvGrpSpPr/>
+        <p:nvPr/>
+      </p:nvGrpSpPr>
+      <p:grpSpPr>
+        <a:xfrm>
+          <a:off x="0" y="0"/>
+          <a:ext cx="0" cy="0"/>
+          <a:chOff x="0" y="0"/>
+          <a:chExt cx="0" cy="0"/>
+        </a:xfrm>
+      </p:grpSpPr>
+      <p:sp>
+        <p:nvSpPr>
+          <p:cNvPr id="2" name="Slide Image Placeholder 1"/>
+          <p:cNvSpPr>
+            <a:spLocks noGrp="1" noRot="1" noChangeAspect="1"/>
+          </p:cNvSpPr>
+          <p:nvPr>
+            <p:ph type="sldImg"/>
+          </p:nvPr>
+        </p:nvSpPr>
+        <p:spPr/>
+      </p:sp>
+      <p:sp>
+        <p:nvSpPr>
+          <p:cNvPr id="3" name="Notes Placeholder 2"/>
+          <p:cNvSpPr>
+            <a:spLocks noGrp="1"/>
+          </p:cNvSpPr>
+          <p:nvPr>
+            <p:ph type="body" idx="1"/>
+          </p:nvPr>
+        </p:nvSpPr>
+        <p:spPr/>
+        <p:txBody>
+          <a:bodyPr/>
+          <a:lstStyle/>
+          <a:p>
+            <a:r>
+              <a:rPr lang="en-US" dirty="0"/>
+              <a:t>What is ML really? Taken this quote from Andrew Ng’s ML course on </a:t>
+            </a:r>
+            <a:r>
+              <a:rPr lang="en-US" dirty="0" err="1"/>
+              <a:t>coursera</a:t>
+            </a:r>
+            <a:r>
+              <a:rPr lang="en-US" dirty="0"/>
+              <a:t> (high recommend) and he says that … </a:t>
+            </a:r>
+          </a:p>
+          <a:p>
+            <a:r>
+              <a:rPr lang="en-US" dirty="0"/>
+              <a:t>Usually when we want a computer to do something for us, we right down line-by-line a list of instructions. But this isn’t appropriate for all tasks, and in ML we do something a bit different…</a:t>
+            </a:r>
+          </a:p>
+        </p:txBody>
+      </p:sp>
+      <p:sp>
+        <p:nvSpPr>
+          <p:cNvPr id="4" name="Slide Number Placeholder 3"/>
+          <p:cNvSpPr>
+            <a:spLocks noGrp="1"/>
+          </p:cNvSpPr>
+          <p:nvPr>
+            <p:ph type="sldNum" sz="quarter" idx="5"/>
+          </p:nvPr>
+        </p:nvSpPr>
+        <p:spPr/>
+        <p:txBody>
+          <a:bodyPr/>
+          <a:lstStyle/>
+          <a:p>
+            <a:fld id="{7F5114C7-38D7-A14C-A721-E01B38AB3211}" type="slidenum">
+              <a:rPr lang="en-US" smtClean="0"/>
+              <a:t>3</a:t>
+            </a:fld>
+            <a:endParaRPr lang="en-US"/>
+          </a:p>
+        </p:txBody>
+      </p:sp>
+    </p:spTree>
+    <p:extLst>
+      <p:ext uri="{BB962C8B-B14F-4D97-AF65-F5344CB8AC3E}">
+        <p14:creationId xmlns:p14="http://schemas.microsoft.com/office/powerpoint/2010/main" val="1518071162"/>
+      </p:ext>
+    </p:extLst>
+  </p:cSld>
+  <p:clrMapOvr>
+    <a:masterClrMapping/>
+  </p:clrMapOvr>
+</p:notes>
+</file>
+
+<file path=ppt/notesSlides/notesSlide30.xml><?xml version="1.0" encoding="utf-8"?>
 <p:notes xmlns:a="http://schemas.openxmlformats.org/drawingml/2006/main" xmlns:r="http://schemas.openxmlformats.org/officeDocument/2006/relationships" xmlns:p="http://schemas.openxmlformats.org/presentationml/2006/main">
   <p:cSld>
     <p:spTree>
@@ -17718,90 +18637,6 @@
 </p:notes>
 </file>
 
-<file path=ppt/notesSlides/notesSlide3.xml><?xml version="1.0" encoding="utf-8"?>
-<p:notes xmlns:a="http://schemas.openxmlformats.org/drawingml/2006/main" xmlns:r="http://schemas.openxmlformats.org/officeDocument/2006/relationships" xmlns:p="http://schemas.openxmlformats.org/presentationml/2006/main">
-  <p:cSld>
-    <p:spTree>
-      <p:nvGrpSpPr>
-        <p:cNvPr id="1" name=""/>
-        <p:cNvGrpSpPr/>
-        <p:nvPr/>
-      </p:nvGrpSpPr>
-      <p:grpSpPr>
-        <a:xfrm>
-          <a:off x="0" y="0"/>
-          <a:ext cx="0" cy="0"/>
-          <a:chOff x="0" y="0"/>
-          <a:chExt cx="0" cy="0"/>
-        </a:xfrm>
-      </p:grpSpPr>
-      <p:sp>
-        <p:nvSpPr>
-          <p:cNvPr id="2" name="Slide Image Placeholder 1"/>
-          <p:cNvSpPr>
-            <a:spLocks noGrp="1" noRot="1" noChangeAspect="1"/>
-          </p:cNvSpPr>
-          <p:nvPr>
-            <p:ph type="sldImg"/>
-          </p:nvPr>
-        </p:nvSpPr>
-        <p:spPr/>
-      </p:sp>
-      <p:sp>
-        <p:nvSpPr>
-          <p:cNvPr id="3" name="Notes Placeholder 2"/>
-          <p:cNvSpPr>
-            <a:spLocks noGrp="1"/>
-          </p:cNvSpPr>
-          <p:nvPr>
-            <p:ph type="body" idx="1"/>
-          </p:nvPr>
-        </p:nvSpPr>
-        <p:spPr/>
-        <p:txBody>
-          <a:bodyPr/>
-          <a:lstStyle/>
-          <a:p>
-            <a:endParaRPr lang="en-US" dirty="0"/>
-          </a:p>
-        </p:txBody>
-      </p:sp>
-      <p:sp>
-        <p:nvSpPr>
-          <p:cNvPr id="4" name="Slide Number Placeholder 3"/>
-          <p:cNvSpPr>
-            <a:spLocks noGrp="1"/>
-          </p:cNvSpPr>
-          <p:nvPr>
-            <p:ph type="sldNum" sz="quarter" idx="5"/>
-          </p:nvPr>
-        </p:nvSpPr>
-        <p:spPr/>
-        <p:txBody>
-          <a:bodyPr/>
-          <a:lstStyle/>
-          <a:p>
-            <a:fld id="{7F5114C7-38D7-A14C-A721-E01B38AB3211}" type="slidenum">
-              <a:rPr lang="en-US" smtClean="0"/>
-              <a:t>3</a:t>
-            </a:fld>
-            <a:endParaRPr lang="en-US"/>
-          </a:p>
-        </p:txBody>
-      </p:sp>
-    </p:spTree>
-    <p:extLst>
-      <p:ext uri="{BB962C8B-B14F-4D97-AF65-F5344CB8AC3E}">
-        <p14:creationId xmlns:p14="http://schemas.microsoft.com/office/powerpoint/2010/main" val="1518071162"/>
-      </p:ext>
-    </p:extLst>
-  </p:cSld>
-  <p:clrMapOvr>
-    <a:masterClrMapping/>
-  </p:clrMapOvr>
-</p:notes>
-</file>
-
 <file path=ppt/notesSlides/notesSlide4.xml><?xml version="1.0" encoding="utf-8"?>
 <p:notes xmlns:a="http://schemas.openxmlformats.org/drawingml/2006/main" xmlns:r="http://schemas.openxmlformats.org/officeDocument/2006/relationships" xmlns:p="http://schemas.openxmlformats.org/presentationml/2006/main">
   <p:cSld>
@@ -17846,7 +18681,16 @@
           <a:bodyPr/>
           <a:lstStyle/>
           <a:p>
-            <a:endParaRPr lang="en-US" dirty="0"/>
+            <a:r>
+              <a:rPr lang="en-GB" dirty="0"/>
+              <a:t>Draw an analogy to human learning (take with a pinch of salt!)</a:t>
+            </a:r>
+          </a:p>
+          <a:p>
+            <a:r>
+              <a:rPr lang="en-GB" dirty="0"/>
+              <a:t>Think about learning in the formal setting e.g. a classroom – two main ingredients: textbook which contains the information we want to learn, and a teacher, someone to guide us in the learning process. Similar in ML, …</a:t>
+            </a:r>
           </a:p>
         </p:txBody>
       </p:sp>
@@ -17867,7 +18711,7 @@
           <a:p>
             <a:fld id="{7F5114C7-38D7-A14C-A721-E01B38AB3211}" type="slidenum">
               <a:rPr lang="en-US" smtClean="0"/>
-              <a:t>5</a:t>
+              <a:t>4</a:t>
             </a:fld>
             <a:endParaRPr lang="en-US"/>
           </a:p>
@@ -17876,7 +18720,7 @@
     </p:spTree>
     <p:extLst>
       <p:ext uri="{BB962C8B-B14F-4D97-AF65-F5344CB8AC3E}">
-        <p14:creationId xmlns:p14="http://schemas.microsoft.com/office/powerpoint/2010/main" val="3075692666"/>
+        <p14:creationId xmlns:p14="http://schemas.microsoft.com/office/powerpoint/2010/main" val="4125585783"/>
       </p:ext>
     </p:extLst>
   </p:cSld>
@@ -17930,7 +18774,16 @@
           <a:bodyPr/>
           <a:lstStyle/>
           <a:p>
-            <a:endParaRPr lang="en-US" dirty="0"/>
+            <a:r>
+              <a:rPr lang="en-US" dirty="0"/>
+              <a:t>But it’s not a teacher and a textbook, but rather data and an algorithm.</a:t>
+            </a:r>
+          </a:p>
+          <a:p>
+            <a:r>
+              <a:rPr lang="en-US" dirty="0"/>
+              <a:t>Will be different depending on the kind of problem you’re dealing with – e.g. disease diagnosis from screening – lots of radiological images + CNN</a:t>
+            </a:r>
           </a:p>
         </p:txBody>
       </p:sp>
@@ -17951,7 +18804,7 @@
           <a:p>
             <a:fld id="{7F5114C7-38D7-A14C-A721-E01B38AB3211}" type="slidenum">
               <a:rPr lang="en-US" smtClean="0"/>
-              <a:t>7</a:t>
+              <a:t>5</a:t>
             </a:fld>
             <a:endParaRPr lang="en-US"/>
           </a:p>
@@ -17960,7 +18813,7 @@
     </p:spTree>
     <p:extLst>
       <p:ext uri="{BB962C8B-B14F-4D97-AF65-F5344CB8AC3E}">
-        <p14:creationId xmlns:p14="http://schemas.microsoft.com/office/powerpoint/2010/main" val="369565834"/>
+        <p14:creationId xmlns:p14="http://schemas.microsoft.com/office/powerpoint/2010/main" val="3075692666"/>
       </p:ext>
     </p:extLst>
   </p:cSld>
@@ -18014,7 +18867,75 @@
           <a:bodyPr/>
           <a:lstStyle/>
           <a:p>
-            <a:endParaRPr lang="en-US" dirty="0"/>
+            <a:r>
+              <a:rPr lang="en-GB" dirty="0"/>
+              <a:t>Same kind of steps for each ML problem</a:t>
+            </a:r>
+          </a:p>
+          <a:p>
+            <a:pPr marL="228600" indent="-228600">
+              <a:buAutoNum type="arabicPeriod"/>
+            </a:pPr>
+            <a:r>
+              <a:rPr lang="en-GB" dirty="0"/>
+              <a:t>Collect and prepare the data or learning material – part of that is making sure that the data is in a nice form. When we want to learn something, it’s much easier if all the info is organised nicely in a textbook, rather than on lots of haphazard pieces of paper written by different people using different conventions. Need to do some work to preprocess the data sometimes – we’ll talk about that later</a:t>
+            </a:r>
+          </a:p>
+          <a:p>
+            <a:pPr marL="228600" indent="-228600">
+              <a:buAutoNum type="arabicPeriod"/>
+            </a:pPr>
+            <a:r>
+              <a:rPr lang="en-GB" dirty="0"/>
+              <a:t>Select an appropriate model – depends on kind of model. </a:t>
+            </a:r>
+            <a:r>
+              <a:rPr lang="en-GB" dirty="0" err="1"/>
+              <a:t>E.g</a:t>
+            </a:r>
+            <a:r>
+              <a:rPr lang="en-GB" dirty="0"/>
+              <a:t> want to learn French, won’t go to a German teacher</a:t>
+            </a:r>
+          </a:p>
+          <a:p>
+            <a:pPr marL="228600" indent="-228600">
+              <a:buAutoNum type="arabicPeriod"/>
+            </a:pPr>
+            <a:r>
+              <a:rPr lang="en-GB" dirty="0"/>
+              <a:t>Train model – sit in the classroom and learn the material</a:t>
+            </a:r>
+          </a:p>
+          <a:p>
+            <a:pPr marL="228600" indent="-228600">
+              <a:buAutoNum type="arabicPeriod"/>
+            </a:pPr>
+            <a:r>
+              <a:rPr lang="en-GB" dirty="0"/>
+              <a:t>Evaluate – take the ”exam” – different metrics exist to quantify how well our model is performing at the given task</a:t>
+            </a:r>
+          </a:p>
+          <a:p>
+            <a:pPr marL="228600" indent="-228600">
+              <a:buAutoNum type="arabicPeriod"/>
+            </a:pPr>
+            <a:endParaRPr lang="en-GB" dirty="0"/>
+          </a:p>
+          <a:p>
+            <a:pPr marL="228600" indent="-228600">
+              <a:buAutoNum type="arabicPeriod"/>
+            </a:pPr>
+            <a:endParaRPr lang="en-GB" dirty="0"/>
+          </a:p>
+          <a:p>
+            <a:pPr marL="228600" indent="-228600">
+              <a:buAutoNum type="arabicPeriod"/>
+            </a:pPr>
+            <a:r>
+              <a:rPr lang="en-GB" dirty="0"/>
+              <a:t>Focus on middle two steps in this session</a:t>
+            </a:r>
           </a:p>
         </p:txBody>
       </p:sp>
@@ -18035,7 +18956,7 @@
           <a:p>
             <a:fld id="{7F5114C7-38D7-A14C-A721-E01B38AB3211}" type="slidenum">
               <a:rPr lang="en-US" smtClean="0"/>
-              <a:t>8</a:t>
+              <a:t>6</a:t>
             </a:fld>
             <a:endParaRPr lang="en-US"/>
           </a:p>
@@ -18044,7 +18965,7 @@
     </p:spTree>
     <p:extLst>
       <p:ext uri="{BB962C8B-B14F-4D97-AF65-F5344CB8AC3E}">
-        <p14:creationId xmlns:p14="http://schemas.microsoft.com/office/powerpoint/2010/main" val="4250680843"/>
+        <p14:creationId xmlns:p14="http://schemas.microsoft.com/office/powerpoint/2010/main" val="603281384"/>
       </p:ext>
     </p:extLst>
   </p:cSld>
@@ -18098,6 +19019,36 @@
           <a:bodyPr/>
           <a:lstStyle/>
           <a:p>
+            <a:r>
+              <a:rPr lang="en-US" dirty="0"/>
+              <a:t>Many different kinds of ML algorithms – we’ll focus on two big branches (but keep in mind that others do exist too)</a:t>
+            </a:r>
+          </a:p>
+          <a:p>
+            <a:endParaRPr lang="en-US" dirty="0"/>
+          </a:p>
+          <a:p>
+            <a:pPr marL="228600" indent="-228600">
+              <a:buAutoNum type="arabicPeriod"/>
+            </a:pPr>
+            <a:r>
+              <a:rPr lang="en-US" dirty="0"/>
+              <a:t>Supervised learning e.g. medical images with labels about whether there is disease or not. Here, two different kinds of objects – circles and stars (shape = label) – use ML to understand how to separate these two groups. X and y values = features</a:t>
+            </a:r>
+          </a:p>
+          <a:p>
+            <a:pPr marL="228600" indent="-228600">
+              <a:buAutoNum type="arabicPeriod"/>
+            </a:pPr>
+            <a:r>
+              <a:rPr lang="en-US" dirty="0"/>
+              <a:t>Unsupervised – no longer have labels, want to find interesting patterns in the data. No different kinds of shapes, but can see there are two distinct groups – there’s some kind of structure in the data, use unsupervised algorithm to uncover this.</a:t>
+            </a:r>
+          </a:p>
+          <a:p>
+            <a:pPr marL="228600" indent="-228600">
+              <a:buAutoNum type="arabicPeriod"/>
+            </a:pPr>
             <a:endParaRPr lang="en-US" dirty="0"/>
           </a:p>
         </p:txBody>
@@ -18119,7 +19070,7 @@
           <a:p>
             <a:fld id="{7F5114C7-38D7-A14C-A721-E01B38AB3211}" type="slidenum">
               <a:rPr lang="en-US" smtClean="0"/>
-              <a:t>9</a:t>
+              <a:t>7</a:t>
             </a:fld>
             <a:endParaRPr lang="en-US"/>
           </a:p>
@@ -18128,7 +19079,7 @@
     </p:spTree>
     <p:extLst>
       <p:ext uri="{BB962C8B-B14F-4D97-AF65-F5344CB8AC3E}">
-        <p14:creationId xmlns:p14="http://schemas.microsoft.com/office/powerpoint/2010/main" val="2614394729"/>
+        <p14:creationId xmlns:p14="http://schemas.microsoft.com/office/powerpoint/2010/main" val="369565834"/>
       </p:ext>
     </p:extLst>
   </p:cSld>
@@ -18182,7 +19133,28 @@
           <a:bodyPr/>
           <a:lstStyle/>
           <a:p>
-            <a:endParaRPr lang="en-US" dirty="0"/>
+            <a:r>
+              <a:rPr lang="en-US" dirty="0"/>
+              <a:t>Within supervised learning, look at two kinds of problems</a:t>
+            </a:r>
+          </a:p>
+          <a:p>
+            <a:pPr marL="228600" indent="-228600">
+              <a:buAutoNum type="arabicPeriod"/>
+            </a:pPr>
+            <a:r>
+              <a:rPr lang="en-US" dirty="0"/>
+              <a:t>Regression – find some sort of trendline</a:t>
+            </a:r>
+          </a:p>
+          <a:p>
+            <a:pPr marL="228600" indent="-228600">
+              <a:buAutoNum type="arabicPeriod"/>
+            </a:pPr>
+            <a:r>
+              <a:rPr lang="en-US" dirty="0"/>
+              <a:t>Classification – predict categories e.g. image classification. No perfect separation, real world data is “messy”</a:t>
+            </a:r>
           </a:p>
         </p:txBody>
       </p:sp>
@@ -18203,7 +19175,7 @@
           <a:p>
             <a:fld id="{7F5114C7-38D7-A14C-A721-E01B38AB3211}" type="slidenum">
               <a:rPr lang="en-US" smtClean="0"/>
-              <a:t>10</a:t>
+              <a:t>8</a:t>
             </a:fld>
             <a:endParaRPr lang="en-US"/>
           </a:p>
@@ -18212,7 +19184,7 @@
     </p:spTree>
     <p:extLst>
       <p:ext uri="{BB962C8B-B14F-4D97-AF65-F5344CB8AC3E}">
-        <p14:creationId xmlns:p14="http://schemas.microsoft.com/office/powerpoint/2010/main" val="683665501"/>
+        <p14:creationId xmlns:p14="http://schemas.microsoft.com/office/powerpoint/2010/main" val="4250680843"/>
       </p:ext>
     </p:extLst>
   </p:cSld>
@@ -18266,7 +19238,28 @@
           <a:bodyPr/>
           <a:lstStyle/>
           <a:p>
-            <a:endParaRPr lang="en-US" dirty="0"/>
+            <a:r>
+              <a:rPr lang="en-US" dirty="0"/>
+              <a:t>Simplest case: Linear regression = fit a straight line to the data</a:t>
+            </a:r>
+          </a:p>
+          <a:p>
+            <a:r>
+              <a:rPr lang="en-US" dirty="0"/>
+              <a:t>Problem: try to predict house price depending on certain characteristics of the house</a:t>
+            </a:r>
+          </a:p>
+          <a:p>
+            <a:r>
+              <a:rPr lang="en-US" dirty="0"/>
+              <a:t>Data: houses that have already sold, the price they were sold at, and how big they were</a:t>
+            </a:r>
+          </a:p>
+          <a:p>
+            <a:r>
+              <a:rPr lang="en-US" dirty="0"/>
+              <a:t>Problem: given a new house, know it’s size, want to know a reasonable price to list it at so that it will sell quickly</a:t>
+            </a:r>
           </a:p>
         </p:txBody>
       </p:sp>
@@ -18287,7 +19280,7 @@
           <a:p>
             <a:fld id="{7F5114C7-38D7-A14C-A721-E01B38AB3211}" type="slidenum">
               <a:rPr lang="en-US" smtClean="0"/>
-              <a:t>11</a:t>
+              <a:t>9</a:t>
             </a:fld>
             <a:endParaRPr lang="en-US"/>
           </a:p>
@@ -18296,7 +19289,7 @@
     </p:spTree>
     <p:extLst>
       <p:ext uri="{BB962C8B-B14F-4D97-AF65-F5344CB8AC3E}">
-        <p14:creationId xmlns:p14="http://schemas.microsoft.com/office/powerpoint/2010/main" val="2339378474"/>
+        <p14:creationId xmlns:p14="http://schemas.microsoft.com/office/powerpoint/2010/main" val="2614394729"/>
       </p:ext>
     </p:extLst>
   </p:cSld>
@@ -18455,7 +19448,7 @@
           <a:p>
             <a:fld id="{3A14F8BD-7288-7E44-81C8-D8EC3CA5469F}" type="datetimeFigureOut">
               <a:rPr lang="en-US" smtClean="0"/>
-              <a:t>10/15/24</a:t>
+              <a:t>10/16/24</a:t>
             </a:fld>
             <a:endParaRPr lang="en-US"/>
           </a:p>
@@ -18655,7 +19648,7 @@
           <a:p>
             <a:fld id="{3A14F8BD-7288-7E44-81C8-D8EC3CA5469F}" type="datetimeFigureOut">
               <a:rPr lang="en-US" smtClean="0"/>
-              <a:t>10/15/24</a:t>
+              <a:t>10/16/24</a:t>
             </a:fld>
             <a:endParaRPr lang="en-US"/>
           </a:p>
@@ -18865,7 +19858,7 @@
           <a:p>
             <a:fld id="{3A14F8BD-7288-7E44-81C8-D8EC3CA5469F}" type="datetimeFigureOut">
               <a:rPr lang="en-US" smtClean="0"/>
-              <a:t>10/15/24</a:t>
+              <a:t>10/16/24</a:t>
             </a:fld>
             <a:endParaRPr lang="en-US"/>
           </a:p>
@@ -19065,7 +20058,7 @@
           <a:p>
             <a:fld id="{3A14F8BD-7288-7E44-81C8-D8EC3CA5469F}" type="datetimeFigureOut">
               <a:rPr lang="en-US" smtClean="0"/>
-              <a:t>10/15/24</a:t>
+              <a:t>10/16/24</a:t>
             </a:fld>
             <a:endParaRPr lang="en-US"/>
           </a:p>
@@ -19341,7 +20334,7 @@
           <a:p>
             <a:fld id="{3A14F8BD-7288-7E44-81C8-D8EC3CA5469F}" type="datetimeFigureOut">
               <a:rPr lang="en-US" smtClean="0"/>
-              <a:t>10/15/24</a:t>
+              <a:t>10/16/24</a:t>
             </a:fld>
             <a:endParaRPr lang="en-US"/>
           </a:p>
@@ -19609,7 +20602,7 @@
           <a:p>
             <a:fld id="{3A14F8BD-7288-7E44-81C8-D8EC3CA5469F}" type="datetimeFigureOut">
               <a:rPr lang="en-US" smtClean="0"/>
-              <a:t>10/15/24</a:t>
+              <a:t>10/16/24</a:t>
             </a:fld>
             <a:endParaRPr lang="en-US"/>
           </a:p>
@@ -20024,7 +21017,7 @@
           <a:p>
             <a:fld id="{3A14F8BD-7288-7E44-81C8-D8EC3CA5469F}" type="datetimeFigureOut">
               <a:rPr lang="en-US" smtClean="0"/>
-              <a:t>10/15/24</a:t>
+              <a:t>10/16/24</a:t>
             </a:fld>
             <a:endParaRPr lang="en-US"/>
           </a:p>
@@ -20166,7 +21159,7 @@
           <a:p>
             <a:fld id="{3A14F8BD-7288-7E44-81C8-D8EC3CA5469F}" type="datetimeFigureOut">
               <a:rPr lang="en-US" smtClean="0"/>
-              <a:t>10/15/24</a:t>
+              <a:t>10/16/24</a:t>
             </a:fld>
             <a:endParaRPr lang="en-US"/>
           </a:p>
@@ -20279,7 +21272,7 @@
           <a:p>
             <a:fld id="{3A14F8BD-7288-7E44-81C8-D8EC3CA5469F}" type="datetimeFigureOut">
               <a:rPr lang="en-US" smtClean="0"/>
-              <a:t>10/15/24</a:t>
+              <a:t>10/16/24</a:t>
             </a:fld>
             <a:endParaRPr lang="en-US"/>
           </a:p>
@@ -20592,7 +21585,7 @@
           <a:p>
             <a:fld id="{3A14F8BD-7288-7E44-81C8-D8EC3CA5469F}" type="datetimeFigureOut">
               <a:rPr lang="en-US" smtClean="0"/>
-              <a:t>10/15/24</a:t>
+              <a:t>10/16/24</a:t>
             </a:fld>
             <a:endParaRPr lang="en-US"/>
           </a:p>
@@ -20881,7 +21874,7 @@
           <a:p>
             <a:fld id="{3A14F8BD-7288-7E44-81C8-D8EC3CA5469F}" type="datetimeFigureOut">
               <a:rPr lang="en-US" smtClean="0"/>
-              <a:t>10/15/24</a:t>
+              <a:t>10/16/24</a:t>
             </a:fld>
             <a:endParaRPr lang="en-US"/>
           </a:p>
@@ -21124,7 +22117,7 @@
           <a:p>
             <a:fld id="{3A14F8BD-7288-7E44-81C8-D8EC3CA5469F}" type="datetimeFigureOut">
               <a:rPr lang="en-US" smtClean="0"/>
-              <a:t>10/15/24</a:t>
+              <a:t>10/16/24</a:t>
             </a:fld>
             <a:endParaRPr lang="en-US"/>
           </a:p>
@@ -22936,7 +23929,7 @@
           <p:nvPr/>
         </p:nvPicPr>
         <p:blipFill>
-          <a:blip r:embed="rId2">
+          <a:blip r:embed="rId3">
             <a:extLst>
               <a:ext uri="{28A0092B-C50C-407E-A947-70E740481C1C}">
                 <a14:useLocalDpi xmlns:a14="http://schemas.microsoft.com/office/drawing/2010/main" val="0"/>
@@ -23105,7 +24098,7 @@
           <p:nvPr/>
         </p:nvPicPr>
         <p:blipFill>
-          <a:blip r:embed="rId2">
+          <a:blip r:embed="rId3">
             <a:extLst>
               <a:ext uri="{28A0092B-C50C-407E-A947-70E740481C1C}">
                 <a14:useLocalDpi xmlns:a14="http://schemas.microsoft.com/office/drawing/2010/main" val="0"/>
@@ -23534,7 +24527,7 @@
         </p:xfrm>
         <a:graphic>
           <a:graphicData uri="http://schemas.openxmlformats.org/drawingml/2006/diagram">
-            <dgm:relIds xmlns:dgm="http://schemas.openxmlformats.org/drawingml/2006/diagram" xmlns:r="http://schemas.openxmlformats.org/officeDocument/2006/relationships" r:dm="rId2" r:lo="rId3" r:qs="rId4" r:cs="rId5"/>
+            <dgm:relIds xmlns:dgm="http://schemas.openxmlformats.org/drawingml/2006/diagram" xmlns:r="http://schemas.openxmlformats.org/officeDocument/2006/relationships" r:dm="rId3" r:lo="rId4" r:qs="rId5" r:cs="rId6"/>
           </a:graphicData>
         </a:graphic>
       </p:graphicFrame>
@@ -23732,7 +24725,7 @@
           <p:nvPr/>
         </p:nvPicPr>
         <p:blipFill>
-          <a:blip r:embed="rId2">
+          <a:blip r:embed="rId3">
             <a:extLst>
               <a:ext uri="{28A0092B-C50C-407E-A947-70E740481C1C}">
                 <a14:useLocalDpi xmlns:a14="http://schemas.microsoft.com/office/drawing/2010/main" val="0"/>
@@ -24401,7 +25394,7 @@
           <p:nvPr/>
         </p:nvPicPr>
         <p:blipFill>
-          <a:blip r:embed="rId2">
+          <a:blip r:embed="rId3">
             <a:extLst>
               <a:ext uri="{28A0092B-C50C-407E-A947-70E740481C1C}">
                 <a14:useLocalDpi xmlns:a14="http://schemas.microsoft.com/office/drawing/2010/main" val="0"/>
@@ -24490,7 +25483,7 @@
         </p:xfrm>
         <a:graphic>
           <a:graphicData uri="http://schemas.openxmlformats.org/drawingml/2006/diagram">
-            <dgm:relIds xmlns:dgm="http://schemas.openxmlformats.org/drawingml/2006/diagram" xmlns:r="http://schemas.openxmlformats.org/officeDocument/2006/relationships" r:dm="rId3" r:lo="rId4" r:qs="rId5" r:cs="rId6"/>
+            <dgm:relIds xmlns:dgm="http://schemas.openxmlformats.org/drawingml/2006/diagram" xmlns:r="http://schemas.openxmlformats.org/officeDocument/2006/relationships" r:dm="rId4" r:lo="rId5" r:qs="rId6" r:cs="rId7"/>
           </a:graphicData>
         </a:graphic>
       </p:graphicFrame>
@@ -25940,7 +26933,7 @@
           <p:nvPr/>
         </p:nvPicPr>
         <p:blipFill>
-          <a:blip r:embed="rId2">
+          <a:blip r:embed="rId3">
             <a:extLst>
               <a:ext uri="{28A0092B-C50C-407E-A947-70E740481C1C}">
                 <a14:useLocalDpi xmlns:a14="http://schemas.microsoft.com/office/drawing/2010/main" val="0"/>
@@ -26036,7 +27029,7 @@
         </p:xfrm>
         <a:graphic>
           <a:graphicData uri="http://schemas.openxmlformats.org/drawingml/2006/diagram">
-            <dgm:relIds xmlns:dgm="http://schemas.openxmlformats.org/drawingml/2006/diagram" xmlns:r="http://schemas.openxmlformats.org/officeDocument/2006/relationships" r:dm="rId3" r:lo="rId4" r:qs="rId5" r:cs="rId6"/>
+            <dgm:relIds xmlns:dgm="http://schemas.openxmlformats.org/drawingml/2006/diagram" xmlns:r="http://schemas.openxmlformats.org/officeDocument/2006/relationships" r:dm="rId4" r:lo="rId5" r:qs="rId6" r:cs="rId7"/>
           </a:graphicData>
         </a:graphic>
       </p:graphicFrame>
@@ -27600,7 +28593,7 @@
           <p:nvPr/>
         </p:nvPicPr>
         <p:blipFill>
-          <a:blip r:embed="rId2">
+          <a:blip r:embed="rId3">
             <a:extLst>
               <a:ext uri="{28A0092B-C50C-407E-A947-70E740481C1C}">
                 <a14:useLocalDpi xmlns:a14="http://schemas.microsoft.com/office/drawing/2010/main" val="0"/>
@@ -27751,7 +28744,7 @@
           <p:nvPr/>
         </p:nvPicPr>
         <p:blipFill>
-          <a:blip r:embed="rId3">
+          <a:blip r:embed="rId4">
             <a:extLst>
               <a:ext uri="{28A0092B-C50C-407E-A947-70E740481C1C}">
                 <a14:useLocalDpi xmlns:a14="http://schemas.microsoft.com/office/drawing/2010/main" val="0"/>
@@ -28883,7 +29876,7 @@
         </p:xfrm>
         <a:graphic>
           <a:graphicData uri="http://schemas.openxmlformats.org/drawingml/2006/diagram">
-            <dgm:relIds xmlns:dgm="http://schemas.openxmlformats.org/drawingml/2006/diagram" xmlns:r="http://schemas.openxmlformats.org/officeDocument/2006/relationships" r:dm="rId2" r:lo="rId3" r:qs="rId4" r:cs="rId5"/>
+            <dgm:relIds xmlns:dgm="http://schemas.openxmlformats.org/drawingml/2006/diagram" xmlns:r="http://schemas.openxmlformats.org/officeDocument/2006/relationships" r:dm="rId3" r:lo="rId4" r:qs="rId5" r:cs="rId6"/>
           </a:graphicData>
         </a:graphic>
       </p:graphicFrame>

</xml_diff>